<commit_message>
partie conception du diapo réalisée (pas grand chose... je sais pas quoi mettre) et qq correction de futes sur le dossier que j'ai vu en lisant en diagonale
</commit_message>
<xml_diff>
--- a/ProjetS2/Dossier-Manuel-Presentation/PresentationProjetS2.pptx
+++ b/ProjetS2/Dossier-Manuel-Presentation/PresentationProjetS2.pptx
@@ -1,6 +1,6 @@
 
 <file path=ppt/presentation.xml><?xml version="1.0" encoding="utf-8"?>
-<p:presentation xmlns:a="http://schemas.openxmlformats.org/drawingml/2006/main" xmlns:r="http://schemas.openxmlformats.org/officeDocument/2006/relationships" xmlns:p="http://schemas.openxmlformats.org/presentationml/2006/main" serverZoom="49592" saveSubsetFonts="1">
+<p:presentation xmlns:a="http://schemas.openxmlformats.org/drawingml/2006/main" xmlns:r="http://schemas.openxmlformats.org/officeDocument/2006/relationships" xmlns:p="http://schemas.openxmlformats.org/presentationml/2006/main" serverZoom="40305" saveSubsetFonts="1">
   <p:sldMasterIdLst>
     <p:sldMasterId id="2147483678" r:id="rId1"/>
   </p:sldMasterIdLst>
@@ -134,7 +134,7 @@
   </p:defaultTextStyle>
   <p:extLst>
     <p:ext uri="{EFAFB233-063F-42B5-8137-9DF3F51BA10A}">
-      <p15:sldGuideLst xmlns:p15="http://schemas.microsoft.com/office/powerpoint/2012/main" xmlns="">
+      <p15:sldGuideLst xmlns="" xmlns:p15="http://schemas.microsoft.com/office/powerpoint/2012/main">
         <p15:guide id="1" orient="horz" pos="2160" userDrawn="1">
           <p15:clr>
             <a:srgbClr val="A4A3A4"/>
@@ -377,7 +377,7 @@
           <a:p>
             <a:fld id="{02AD1CBD-E0FB-4F97-9B07-04EEBC115ADC}" type="datetimeFigureOut">
               <a:rPr lang="fr-FR" smtClean="0"/>
-              <a:t>30/05/2015</a:t>
+              <a:t>31/05/2015</a:t>
             </a:fld>
             <a:endParaRPr lang="fr-FR"/>
           </a:p>
@@ -419,7 +419,7 @@
           <a:p>
             <a:fld id="{B4E1FA03-DE6C-41FB-B508-C0E99749F86B}" type="slidenum">
               <a:rPr lang="fr-FR" smtClean="0"/>
-              <a:t>‹#›</a:t>
+              <a:t>‹N°›</a:t>
             </a:fld>
             <a:endParaRPr lang="fr-FR"/>
           </a:p>
@@ -473,13 +473,13 @@
   <p:clrMapOvr>
     <a:masterClrMapping/>
   </p:clrMapOvr>
-  <mc:AlternateContent xmlns:mc="http://schemas.openxmlformats.org/markup-compatibility/2006">
-    <mc:Choice xmlns:p14="http://schemas.microsoft.com/office/powerpoint/2010/main" Requires="p14">
+  <mc:AlternateContent xmlns:mc="http://schemas.openxmlformats.org/markup-compatibility/2006" xmlns:p14="http://schemas.microsoft.com/office/powerpoint/2010/main">
+    <mc:Choice Requires="p14">
       <p:transition spd="slow" p14:dur="1500">
         <p14:reveal/>
       </p:transition>
     </mc:Choice>
-    <mc:Fallback>
+    <mc:Fallback xmlns="">
       <p:transition spd="slow">
         <p:fade/>
       </p:transition>
@@ -597,7 +597,7 @@
           <a:p>
             <a:fld id="{02AD1CBD-E0FB-4F97-9B07-04EEBC115ADC}" type="datetimeFigureOut">
               <a:rPr lang="fr-FR" smtClean="0"/>
-              <a:t>30/05/2015</a:t>
+              <a:t>31/05/2015</a:t>
             </a:fld>
             <a:endParaRPr lang="fr-FR"/>
           </a:p>
@@ -639,7 +639,7 @@
           <a:p>
             <a:fld id="{B4E1FA03-DE6C-41FB-B508-C0E99749F86B}" type="slidenum">
               <a:rPr lang="fr-FR" smtClean="0"/>
-              <a:t>‹#›</a:t>
+              <a:t>‹N°›</a:t>
             </a:fld>
             <a:endParaRPr lang="fr-FR"/>
           </a:p>
@@ -655,13 +655,13 @@
   <p:clrMapOvr>
     <a:masterClrMapping/>
   </p:clrMapOvr>
-  <mc:AlternateContent xmlns:mc="http://schemas.openxmlformats.org/markup-compatibility/2006">
-    <mc:Choice xmlns:p14="http://schemas.microsoft.com/office/powerpoint/2010/main" Requires="p14">
+  <mc:AlternateContent xmlns:mc="http://schemas.openxmlformats.org/markup-compatibility/2006" xmlns:p14="http://schemas.microsoft.com/office/powerpoint/2010/main">
+    <mc:Choice Requires="p14">
       <p:transition spd="slow" p14:dur="1500">
         <p14:reveal/>
       </p:transition>
     </mc:Choice>
-    <mc:Fallback>
+    <mc:Fallback xmlns="">
       <p:transition spd="slow">
         <p:fade/>
       </p:transition>
@@ -865,7 +865,7 @@
           <a:p>
             <a:fld id="{02AD1CBD-E0FB-4F97-9B07-04EEBC115ADC}" type="datetimeFigureOut">
               <a:rPr lang="fr-FR" smtClean="0"/>
-              <a:t>30/05/2015</a:t>
+              <a:t>31/05/2015</a:t>
             </a:fld>
             <a:endParaRPr lang="fr-FR"/>
           </a:p>
@@ -907,7 +907,7 @@
           <a:p>
             <a:fld id="{B4E1FA03-DE6C-41FB-B508-C0E99749F86B}" type="slidenum">
               <a:rPr lang="fr-FR" smtClean="0"/>
-              <a:t>‹#›</a:t>
+              <a:t>‹N°›</a:t>
             </a:fld>
             <a:endParaRPr lang="fr-FR"/>
           </a:p>
@@ -923,13 +923,13 @@
   <p:clrMapOvr>
     <a:masterClrMapping/>
   </p:clrMapOvr>
-  <mc:AlternateContent xmlns:mc="http://schemas.openxmlformats.org/markup-compatibility/2006">
-    <mc:Choice xmlns:p14="http://schemas.microsoft.com/office/powerpoint/2010/main" Requires="p14">
+  <mc:AlternateContent xmlns:mc="http://schemas.openxmlformats.org/markup-compatibility/2006" xmlns:p14="http://schemas.microsoft.com/office/powerpoint/2010/main">
+    <mc:Choice Requires="p14">
       <p:transition spd="slow" p14:dur="1500">
         <p14:reveal/>
       </p:transition>
     </mc:Choice>
-    <mc:Fallback>
+    <mc:Fallback xmlns="">
       <p:transition spd="slow">
         <p:fade/>
       </p:transition>
@@ -1051,7 +1051,7 @@
           <a:p>
             <a:fld id="{02AD1CBD-E0FB-4F97-9B07-04EEBC115ADC}" type="datetimeFigureOut">
               <a:rPr lang="fr-FR" smtClean="0"/>
-              <a:t>30/05/2015</a:t>
+              <a:t>31/05/2015</a:t>
             </a:fld>
             <a:endParaRPr lang="fr-FR"/>
           </a:p>
@@ -1093,7 +1093,7 @@
           <a:p>
             <a:fld id="{B4E1FA03-DE6C-41FB-B508-C0E99749F86B}" type="slidenum">
               <a:rPr lang="fr-FR" smtClean="0"/>
-              <a:t>‹#›</a:t>
+              <a:t>‹N°›</a:t>
             </a:fld>
             <a:endParaRPr lang="fr-FR"/>
           </a:p>
@@ -1109,13 +1109,13 @@
   <p:clrMapOvr>
     <a:masterClrMapping/>
   </p:clrMapOvr>
-  <mc:AlternateContent xmlns:mc="http://schemas.openxmlformats.org/markup-compatibility/2006">
-    <mc:Choice xmlns:p14="http://schemas.microsoft.com/office/powerpoint/2010/main" Requires="p14">
+  <mc:AlternateContent xmlns:mc="http://schemas.openxmlformats.org/markup-compatibility/2006" xmlns:p14="http://schemas.microsoft.com/office/powerpoint/2010/main">
+    <mc:Choice Requires="p14">
       <p:transition spd="slow" p14:dur="1500">
         <p14:reveal/>
       </p:transition>
     </mc:Choice>
-    <mc:Fallback>
+    <mc:Fallback xmlns="">
       <p:transition spd="slow">
         <p:fade/>
       </p:transition>
@@ -1406,7 +1406,7 @@
           <a:p>
             <a:fld id="{02AD1CBD-E0FB-4F97-9B07-04EEBC115ADC}" type="datetimeFigureOut">
               <a:rPr lang="fr-FR" smtClean="0"/>
-              <a:t>30/05/2015</a:t>
+              <a:t>31/05/2015</a:t>
             </a:fld>
             <a:endParaRPr lang="fr-FR"/>
           </a:p>
@@ -1448,7 +1448,7 @@
           <a:p>
             <a:fld id="{B4E1FA03-DE6C-41FB-B508-C0E99749F86B}" type="slidenum">
               <a:rPr lang="fr-FR" smtClean="0"/>
-              <a:t>‹#›</a:t>
+              <a:t>‹N°›</a:t>
             </a:fld>
             <a:endParaRPr lang="fr-FR"/>
           </a:p>
@@ -1502,13 +1502,13 @@
   <p:clrMapOvr>
     <a:masterClrMapping/>
   </p:clrMapOvr>
-  <mc:AlternateContent xmlns:mc="http://schemas.openxmlformats.org/markup-compatibility/2006">
-    <mc:Choice xmlns:p14="http://schemas.microsoft.com/office/powerpoint/2010/main" Requires="p14">
+  <mc:AlternateContent xmlns:mc="http://schemas.openxmlformats.org/markup-compatibility/2006" xmlns:p14="http://schemas.microsoft.com/office/powerpoint/2010/main">
+    <mc:Choice Requires="p14">
       <p:transition spd="slow" p14:dur="1500">
         <p14:reveal/>
       </p:transition>
     </mc:Choice>
-    <mc:Fallback>
+    <mc:Fallback xmlns="">
       <p:transition spd="slow">
         <p:fade/>
       </p:transition>
@@ -1693,7 +1693,7 @@
           <a:p>
             <a:fld id="{02AD1CBD-E0FB-4F97-9B07-04EEBC115ADC}" type="datetimeFigureOut">
               <a:rPr lang="fr-FR" smtClean="0"/>
-              <a:t>30/05/2015</a:t>
+              <a:t>31/05/2015</a:t>
             </a:fld>
             <a:endParaRPr lang="fr-FR"/>
           </a:p>
@@ -1735,7 +1735,7 @@
           <a:p>
             <a:fld id="{B4E1FA03-DE6C-41FB-B508-C0E99749F86B}" type="slidenum">
               <a:rPr lang="fr-FR" smtClean="0"/>
-              <a:t>‹#›</a:t>
+              <a:t>‹N°›</a:t>
             </a:fld>
             <a:endParaRPr lang="fr-FR"/>
           </a:p>
@@ -1751,13 +1751,13 @@
   <p:clrMapOvr>
     <a:masterClrMapping/>
   </p:clrMapOvr>
-  <mc:AlternateContent xmlns:mc="http://schemas.openxmlformats.org/markup-compatibility/2006">
-    <mc:Choice xmlns:p14="http://schemas.microsoft.com/office/powerpoint/2010/main" Requires="p14">
+  <mc:AlternateContent xmlns:mc="http://schemas.openxmlformats.org/markup-compatibility/2006" xmlns:p14="http://schemas.microsoft.com/office/powerpoint/2010/main">
+    <mc:Choice Requires="p14">
       <p:transition spd="slow" p14:dur="1500">
         <p14:reveal/>
       </p:transition>
     </mc:Choice>
-    <mc:Fallback>
+    <mc:Fallback xmlns="">
       <p:transition spd="slow">
         <p:fade/>
       </p:transition>
@@ -2084,7 +2084,7 @@
           <a:p>
             <a:fld id="{02AD1CBD-E0FB-4F97-9B07-04EEBC115ADC}" type="datetimeFigureOut">
               <a:rPr lang="fr-FR" smtClean="0"/>
-              <a:t>30/05/2015</a:t>
+              <a:t>31/05/2015</a:t>
             </a:fld>
             <a:endParaRPr lang="fr-FR"/>
           </a:p>
@@ -2126,7 +2126,7 @@
           <a:p>
             <a:fld id="{B4E1FA03-DE6C-41FB-B508-C0E99749F86B}" type="slidenum">
               <a:rPr lang="fr-FR" smtClean="0"/>
-              <a:t>‹#›</a:t>
+              <a:t>‹N°›</a:t>
             </a:fld>
             <a:endParaRPr lang="fr-FR"/>
           </a:p>
@@ -2142,13 +2142,13 @@
   <p:clrMapOvr>
     <a:masterClrMapping/>
   </p:clrMapOvr>
-  <mc:AlternateContent xmlns:mc="http://schemas.openxmlformats.org/markup-compatibility/2006">
-    <mc:Choice xmlns:p14="http://schemas.microsoft.com/office/powerpoint/2010/main" Requires="p14">
+  <mc:AlternateContent xmlns:mc="http://schemas.openxmlformats.org/markup-compatibility/2006" xmlns:p14="http://schemas.microsoft.com/office/powerpoint/2010/main">
+    <mc:Choice Requires="p14">
       <p:transition spd="slow" p14:dur="1500">
         <p14:reveal/>
       </p:transition>
     </mc:Choice>
-    <mc:Fallback>
+    <mc:Fallback xmlns="">
       <p:transition spd="slow">
         <p:fade/>
       </p:transition>
@@ -2214,7 +2214,7 @@
           <a:p>
             <a:fld id="{02AD1CBD-E0FB-4F97-9B07-04EEBC115ADC}" type="datetimeFigureOut">
               <a:rPr lang="fr-FR" smtClean="0"/>
-              <a:t>30/05/2015</a:t>
+              <a:t>31/05/2015</a:t>
             </a:fld>
             <a:endParaRPr lang="fr-FR"/>
           </a:p>
@@ -2256,7 +2256,7 @@
           <a:p>
             <a:fld id="{B4E1FA03-DE6C-41FB-B508-C0E99749F86B}" type="slidenum">
               <a:rPr lang="fr-FR" smtClean="0"/>
-              <a:t>‹#›</a:t>
+              <a:t>‹N°›</a:t>
             </a:fld>
             <a:endParaRPr lang="fr-FR"/>
           </a:p>
@@ -2272,13 +2272,13 @@
   <p:clrMapOvr>
     <a:masterClrMapping/>
   </p:clrMapOvr>
-  <mc:AlternateContent xmlns:mc="http://schemas.openxmlformats.org/markup-compatibility/2006">
-    <mc:Choice xmlns:p14="http://schemas.microsoft.com/office/powerpoint/2010/main" Requires="p14">
+  <mc:AlternateContent xmlns:mc="http://schemas.openxmlformats.org/markup-compatibility/2006" xmlns:p14="http://schemas.microsoft.com/office/powerpoint/2010/main">
+    <mc:Choice Requires="p14">
       <p:transition spd="slow" p14:dur="1500">
         <p14:reveal/>
       </p:transition>
     </mc:Choice>
-    <mc:Fallback>
+    <mc:Fallback xmlns="">
       <p:transition spd="slow">
         <p:fade/>
       </p:transition>
@@ -2397,7 +2397,7 @@
           <a:p>
             <a:fld id="{02AD1CBD-E0FB-4F97-9B07-04EEBC115ADC}" type="datetimeFigureOut">
               <a:rPr lang="fr-FR" smtClean="0"/>
-              <a:t>30/05/2015</a:t>
+              <a:t>31/05/2015</a:t>
             </a:fld>
             <a:endParaRPr lang="fr-FR"/>
           </a:p>
@@ -2447,7 +2447,7 @@
           <a:p>
             <a:fld id="{B4E1FA03-DE6C-41FB-B508-C0E99749F86B}" type="slidenum">
               <a:rPr lang="fr-FR" smtClean="0"/>
-              <a:t>‹#›</a:t>
+              <a:t>‹N°›</a:t>
             </a:fld>
             <a:endParaRPr lang="fr-FR"/>
           </a:p>
@@ -2463,13 +2463,13 @@
   <p:clrMapOvr>
     <a:masterClrMapping/>
   </p:clrMapOvr>
-  <mc:AlternateContent xmlns:mc="http://schemas.openxmlformats.org/markup-compatibility/2006">
-    <mc:Choice xmlns:p14="http://schemas.microsoft.com/office/powerpoint/2010/main" Requires="p14">
+  <mc:AlternateContent xmlns:mc="http://schemas.openxmlformats.org/markup-compatibility/2006" xmlns:p14="http://schemas.microsoft.com/office/powerpoint/2010/main">
+    <mc:Choice Requires="p14">
       <p:transition spd="slow" p14:dur="1500">
         <p14:reveal/>
       </p:transition>
     </mc:Choice>
-    <mc:Fallback>
+    <mc:Fallback xmlns="">
       <p:transition spd="slow">
         <p:fade/>
       </p:transition>
@@ -2763,7 +2763,7 @@
           <a:p>
             <a:fld id="{02AD1CBD-E0FB-4F97-9B07-04EEBC115ADC}" type="datetimeFigureOut">
               <a:rPr lang="fr-FR" smtClean="0"/>
-              <a:t>30/05/2015</a:t>
+              <a:t>31/05/2015</a:t>
             </a:fld>
             <a:endParaRPr lang="fr-FR"/>
           </a:p>
@@ -2826,7 +2826,7 @@
           <a:p>
             <a:fld id="{B4E1FA03-DE6C-41FB-B508-C0E99749F86B}" type="slidenum">
               <a:rPr lang="fr-FR" smtClean="0"/>
-              <a:t>‹#›</a:t>
+              <a:t>‹N°›</a:t>
             </a:fld>
             <a:endParaRPr lang="fr-FR"/>
           </a:p>
@@ -2842,13 +2842,13 @@
   <p:clrMapOvr>
     <a:masterClrMapping/>
   </p:clrMapOvr>
-  <mc:AlternateContent xmlns:mc="http://schemas.openxmlformats.org/markup-compatibility/2006">
-    <mc:Choice xmlns:p14="http://schemas.microsoft.com/office/powerpoint/2010/main" Requires="p14">
+  <mc:AlternateContent xmlns:mc="http://schemas.openxmlformats.org/markup-compatibility/2006" xmlns:p14="http://schemas.microsoft.com/office/powerpoint/2010/main">
+    <mc:Choice Requires="p14">
       <p:transition spd="slow" p14:dur="1500">
         <p14:reveal/>
       </p:transition>
     </mc:Choice>
-    <mc:Fallback>
+    <mc:Fallback xmlns="">
       <p:transition spd="slow">
         <p:fade/>
       </p:transition>
@@ -3157,7 +3157,7 @@
           <a:p>
             <a:fld id="{02AD1CBD-E0FB-4F97-9B07-04EEBC115ADC}" type="datetimeFigureOut">
               <a:rPr lang="fr-FR" smtClean="0"/>
-              <a:t>30/05/2015</a:t>
+              <a:t>31/05/2015</a:t>
             </a:fld>
             <a:endParaRPr lang="fr-FR"/>
           </a:p>
@@ -3199,7 +3199,7 @@
           <a:p>
             <a:fld id="{B4E1FA03-DE6C-41FB-B508-C0E99749F86B}" type="slidenum">
               <a:rPr lang="fr-FR" smtClean="0"/>
-              <a:t>‹#›</a:t>
+              <a:t>‹N°›</a:t>
             </a:fld>
             <a:endParaRPr lang="fr-FR"/>
           </a:p>
@@ -3215,13 +3215,13 @@
   <p:clrMapOvr>
     <a:masterClrMapping/>
   </p:clrMapOvr>
-  <mc:AlternateContent xmlns:mc="http://schemas.openxmlformats.org/markup-compatibility/2006">
-    <mc:Choice xmlns:p14="http://schemas.microsoft.com/office/powerpoint/2010/main" Requires="p14">
+  <mc:AlternateContent xmlns:mc="http://schemas.openxmlformats.org/markup-compatibility/2006" xmlns:p14="http://schemas.microsoft.com/office/powerpoint/2010/main">
+    <mc:Choice Requires="p14">
       <p:transition spd="slow" p14:dur="1500">
         <p14:reveal/>
       </p:transition>
     </mc:Choice>
-    <mc:Fallback>
+    <mc:Fallback xmlns="">
       <p:transition spd="slow">
         <p:fade/>
       </p:transition>
@@ -3456,7 +3456,7 @@
           <a:p>
             <a:fld id="{02AD1CBD-E0FB-4F97-9B07-04EEBC115ADC}" type="datetimeFigureOut">
               <a:rPr lang="fr-FR" smtClean="0"/>
-              <a:t>30/05/2015</a:t>
+              <a:t>31/05/2015</a:t>
             </a:fld>
             <a:endParaRPr lang="fr-FR"/>
           </a:p>
@@ -3530,7 +3530,7 @@
           <a:p>
             <a:fld id="{B4E1FA03-DE6C-41FB-B508-C0E99749F86B}" type="slidenum">
               <a:rPr lang="fr-FR" smtClean="0"/>
-              <a:t>‹#›</a:t>
+              <a:t>‹N°›</a:t>
             </a:fld>
             <a:endParaRPr lang="fr-FR"/>
           </a:p>
@@ -3595,13 +3595,13 @@
     <p:sldLayoutId id="2147483688" r:id="rId10"/>
     <p:sldLayoutId id="2147483689" r:id="rId11"/>
   </p:sldLayoutIdLst>
-  <mc:AlternateContent xmlns:mc="http://schemas.openxmlformats.org/markup-compatibility/2006">
-    <mc:Choice xmlns:p14="http://schemas.microsoft.com/office/powerpoint/2010/main" Requires="p14">
+  <mc:AlternateContent xmlns:mc="http://schemas.openxmlformats.org/markup-compatibility/2006" xmlns:p14="http://schemas.microsoft.com/office/powerpoint/2010/main">
+    <mc:Choice Requires="p14">
       <p:transition spd="slow" p14:dur="1500">
         <p14:reveal/>
       </p:transition>
     </mc:Choice>
-    <mc:Fallback>
+    <mc:Fallback xmlns="">
       <p:transition spd="slow">
         <p:fade/>
       </p:transition>
@@ -4168,13 +4168,13 @@
   <p:clrMapOvr>
     <a:masterClrMapping/>
   </p:clrMapOvr>
-  <mc:AlternateContent xmlns:mc="http://schemas.openxmlformats.org/markup-compatibility/2006">
-    <mc:Choice xmlns:p14="http://schemas.microsoft.com/office/powerpoint/2010/main" Requires="p14">
+  <mc:AlternateContent xmlns:mc="http://schemas.openxmlformats.org/markup-compatibility/2006" xmlns:p14="http://schemas.microsoft.com/office/powerpoint/2010/main">
+    <mc:Choice Requires="p14">
       <p:transition spd="slow" p14:dur="1500">
         <p14:reveal/>
       </p:transition>
     </mc:Choice>
-    <mc:Fallback>
+    <mc:Fallback xmlns="">
       <p:transition spd="slow">
         <p:fade/>
       </p:transition>
@@ -4542,13 +4542,13 @@
   <p:clrMapOvr>
     <a:masterClrMapping/>
   </p:clrMapOvr>
-  <mc:AlternateContent xmlns:mc="http://schemas.openxmlformats.org/markup-compatibility/2006">
-    <mc:Choice xmlns:p14="http://schemas.microsoft.com/office/powerpoint/2010/main" Requires="p14">
+  <mc:AlternateContent xmlns:mc="http://schemas.openxmlformats.org/markup-compatibility/2006" xmlns:p14="http://schemas.microsoft.com/office/powerpoint/2010/main">
+    <mc:Choice Requires="p14">
       <p:transition spd="slow" p14:dur="1500">
         <p14:reveal/>
       </p:transition>
     </mc:Choice>
-    <mc:Fallback>
+    <mc:Fallback xmlns="">
       <p:transition spd="slow">
         <p:fade/>
       </p:transition>
@@ -4910,13 +4910,13 @@
   <p:clrMapOvr>
     <a:masterClrMapping/>
   </p:clrMapOvr>
-  <mc:AlternateContent xmlns:mc="http://schemas.openxmlformats.org/markup-compatibility/2006">
-    <mc:Choice xmlns:p14="http://schemas.microsoft.com/office/powerpoint/2010/main" Requires="p14">
+  <mc:AlternateContent xmlns:mc="http://schemas.openxmlformats.org/markup-compatibility/2006" xmlns:p14="http://schemas.microsoft.com/office/powerpoint/2010/main">
+    <mc:Choice Requires="p14">
       <p:transition spd="slow" p14:dur="1500">
         <p14:reveal/>
       </p:transition>
     </mc:Choice>
-    <mc:Fallback>
+    <mc:Fallback xmlns="">
       <p:transition spd="slow">
         <p:fade/>
       </p:transition>
@@ -5172,13 +5172,13 @@
   <p:clrMapOvr>
     <a:masterClrMapping/>
   </p:clrMapOvr>
-  <mc:AlternateContent xmlns:mc="http://schemas.openxmlformats.org/markup-compatibility/2006">
-    <mc:Choice xmlns:p14="http://schemas.microsoft.com/office/powerpoint/2010/main" Requires="p14">
+  <mc:AlternateContent xmlns:mc="http://schemas.openxmlformats.org/markup-compatibility/2006" xmlns:p14="http://schemas.microsoft.com/office/powerpoint/2010/main">
+    <mc:Choice Requires="p14">
       <p:transition spd="slow" p14:dur="1500">
         <p14:reveal/>
       </p:transition>
     </mc:Choice>
-    <mc:Fallback>
+    <mc:Fallback xmlns="">
       <p:transition spd="slow">
         <p:fade/>
       </p:transition>
@@ -5358,13 +5358,13 @@
   <p:clrMapOvr>
     <a:masterClrMapping/>
   </p:clrMapOvr>
-  <mc:AlternateContent xmlns:mc="http://schemas.openxmlformats.org/markup-compatibility/2006">
-    <mc:Choice xmlns:p14="http://schemas.microsoft.com/office/powerpoint/2010/main" Requires="p14">
+  <mc:AlternateContent xmlns:mc="http://schemas.openxmlformats.org/markup-compatibility/2006" xmlns:p14="http://schemas.microsoft.com/office/powerpoint/2010/main">
+    <mc:Choice Requires="p14">
       <p:transition spd="slow" p14:dur="1500">
         <p14:reveal/>
       </p:transition>
     </mc:Choice>
-    <mc:Fallback>
+    <mc:Fallback xmlns="">
       <p:transition spd="slow">
         <p:fade/>
       </p:transition>
@@ -5514,6 +5514,19 @@
               </a:rPr>
               <a:t>Cas numéro 1 : </a:t>
             </a:r>
+            <a:r>
+              <a:rPr lang="fr-FR" sz="8000" dirty="0" smtClean="0">
+                <a:solidFill>
+                  <a:schemeClr val="tx1"/>
+                </a:solidFill>
+              </a:rPr>
+              <a:t> Effectuer des calculs</a:t>
+            </a:r>
+            <a:endParaRPr lang="fr-FR" sz="8000" dirty="0" smtClean="0">
+              <a:solidFill>
+                <a:schemeClr val="tx1"/>
+              </a:solidFill>
+            </a:endParaRPr>
           </a:p>
           <a:p>
             <a:pPr marL="91440" lvl="3" indent="-91440">
@@ -5569,6 +5582,19 @@
               </a:rPr>
               <a:t>: </a:t>
             </a:r>
+            <a:r>
+              <a:rPr lang="fr-FR" sz="8000" dirty="0" smtClean="0">
+                <a:solidFill>
+                  <a:schemeClr val="tx1"/>
+                </a:solidFill>
+              </a:rPr>
+              <a:t> Effectuer des calculs simples</a:t>
+            </a:r>
+            <a:endParaRPr lang="fr-FR" sz="8000" dirty="0">
+              <a:solidFill>
+                <a:schemeClr val="tx1"/>
+              </a:solidFill>
+            </a:endParaRPr>
           </a:p>
           <a:p>
             <a:pPr marL="91440" lvl="3" indent="-91440">
@@ -5624,6 +5650,19 @@
               </a:rPr>
               <a:t>: </a:t>
             </a:r>
+            <a:r>
+              <a:rPr lang="fr-FR" sz="8000" dirty="0" smtClean="0">
+                <a:solidFill>
+                  <a:schemeClr val="tx1"/>
+                </a:solidFill>
+              </a:rPr>
+              <a:t> Effectuer des calculs avec parenthèses</a:t>
+            </a:r>
+            <a:endParaRPr lang="fr-FR" sz="8000" dirty="0">
+              <a:solidFill>
+                <a:schemeClr val="tx1"/>
+              </a:solidFill>
+            </a:endParaRPr>
           </a:p>
           <a:p>
             <a:pPr marL="91440" lvl="3" indent="-91440">
@@ -5679,6 +5718,19 @@
               </a:rPr>
               <a:t>: </a:t>
             </a:r>
+            <a:r>
+              <a:rPr lang="fr-FR" sz="8000" dirty="0" smtClean="0">
+                <a:solidFill>
+                  <a:schemeClr val="tx1"/>
+                </a:solidFill>
+              </a:rPr>
+              <a:t> Utiliser une variable</a:t>
+            </a:r>
+            <a:endParaRPr lang="fr-FR" sz="8000" dirty="0">
+              <a:solidFill>
+                <a:schemeClr val="tx1"/>
+              </a:solidFill>
+            </a:endParaRPr>
           </a:p>
           <a:p>
             <a:pPr marL="91440" lvl="3" indent="-91440">
@@ -5726,6 +5778,14 @@
               </a:rPr>
               <a:t>5 : </a:t>
             </a:r>
+            <a:r>
+              <a:rPr lang="fr-FR" sz="8000" dirty="0" smtClean="0">
+                <a:solidFill>
+                  <a:schemeClr val="tx1"/>
+                </a:solidFill>
+              </a:rPr>
+              <a:t> Gérer la mémoire</a:t>
+            </a:r>
             <a:endParaRPr lang="fr-FR" sz="8000" dirty="0">
               <a:solidFill>
                 <a:schemeClr val="tx1"/>
@@ -5765,13 +5825,13 @@
   <p:clrMapOvr>
     <a:masterClrMapping/>
   </p:clrMapOvr>
-  <mc:AlternateContent xmlns:mc="http://schemas.openxmlformats.org/markup-compatibility/2006">
-    <mc:Choice xmlns:p14="http://schemas.microsoft.com/office/powerpoint/2010/main" Requires="p14">
+  <mc:AlternateContent xmlns:mc="http://schemas.openxmlformats.org/markup-compatibility/2006" xmlns:p14="http://schemas.microsoft.com/office/powerpoint/2010/main">
+    <mc:Choice Requires="p14">
       <p:transition spd="slow" p14:dur="1500">
         <p14:reveal/>
       </p:transition>
     </mc:Choice>
-    <mc:Fallback>
+    <mc:Fallback xmlns="">
       <p:transition spd="slow">
         <p:fade/>
       </p:transition>
@@ -5845,7 +5905,7 @@
         </p:nvSpPr>
         <p:spPr>
           <a:xfrm>
-            <a:off x="759854" y="1931831"/>
+            <a:off x="849501" y="2021478"/>
             <a:ext cx="10395826" cy="4250028"/>
           </a:xfrm>
         </p:spPr>
@@ -5883,13 +5943,18 @@
               <a:t>6 </a:t>
             </a:r>
             <a:r>
-              <a:rPr lang="fr-FR" sz="3200" dirty="0">
+              <a:rPr lang="fr-FR" sz="3200" dirty="0" smtClean="0">
                 <a:solidFill>
                   <a:schemeClr val="tx1"/>
                 </a:solidFill>
               </a:rPr>
-              <a:t>: </a:t>
-            </a:r>
+              <a:t>:  Copier/Couper/Coller</a:t>
+            </a:r>
+            <a:endParaRPr lang="fr-FR" sz="3200" dirty="0">
+              <a:solidFill>
+                <a:schemeClr val="tx1"/>
+              </a:solidFill>
+            </a:endParaRPr>
           </a:p>
           <a:p>
             <a:pPr marL="91440" lvl="3" indent="-91440">
@@ -5945,6 +6010,19 @@
               </a:rPr>
               <a:t>: </a:t>
             </a:r>
+            <a:r>
+              <a:rPr lang="fr-FR" sz="3200" dirty="0" smtClean="0">
+                <a:solidFill>
+                  <a:schemeClr val="tx1"/>
+                </a:solidFill>
+              </a:rPr>
+              <a:t> Entrer des formules</a:t>
+            </a:r>
+            <a:endParaRPr lang="fr-FR" sz="3200" dirty="0">
+              <a:solidFill>
+                <a:schemeClr val="tx1"/>
+              </a:solidFill>
+            </a:endParaRPr>
           </a:p>
           <a:p>
             <a:pPr marL="91440" lvl="3" indent="-91440">
@@ -6000,6 +6078,19 @@
               </a:rPr>
               <a:t>: </a:t>
             </a:r>
+            <a:r>
+              <a:rPr lang="fr-FR" sz="3200" dirty="0" smtClean="0">
+                <a:solidFill>
+                  <a:schemeClr val="tx1"/>
+                </a:solidFill>
+              </a:rPr>
+              <a:t> Sauvegarder, charger ou créer un nouveau fichier du tableur</a:t>
+            </a:r>
+            <a:endParaRPr lang="fr-FR" sz="3200" dirty="0">
+              <a:solidFill>
+                <a:schemeClr val="tx1"/>
+              </a:solidFill>
+            </a:endParaRPr>
           </a:p>
           <a:p>
             <a:pPr marL="91440" lvl="3" indent="-91440">
@@ -6055,6 +6146,19 @@
               </a:rPr>
               <a:t>: </a:t>
             </a:r>
+            <a:r>
+              <a:rPr lang="fr-FR" sz="3200" dirty="0" smtClean="0">
+                <a:solidFill>
+                  <a:schemeClr val="tx1"/>
+                </a:solidFill>
+              </a:rPr>
+              <a:t> Accéder à une aide</a:t>
+            </a:r>
+            <a:endParaRPr lang="fr-FR" sz="3200" dirty="0">
+              <a:solidFill>
+                <a:schemeClr val="tx1"/>
+              </a:solidFill>
+            </a:endParaRPr>
           </a:p>
           <a:p>
             <a:pPr marL="91440" lvl="3" indent="-91440">
@@ -6102,6 +6206,19 @@
               </a:rPr>
               <a:t>10 : </a:t>
             </a:r>
+            <a:r>
+              <a:rPr lang="fr-FR" sz="3200" dirty="0" smtClean="0">
+                <a:solidFill>
+                  <a:schemeClr val="tx1"/>
+                </a:solidFill>
+              </a:rPr>
+              <a:t> Naviguer entre Mini-Calculatrice et Mini-Tableur</a:t>
+            </a:r>
+            <a:endParaRPr lang="fr-FR" sz="3200" dirty="0" smtClean="0">
+              <a:solidFill>
+                <a:schemeClr val="tx1"/>
+              </a:solidFill>
+            </a:endParaRPr>
           </a:p>
           <a:p>
             <a:pPr marL="91440" lvl="3" indent="-91440">
@@ -6139,8 +6256,21 @@
                   <a:schemeClr val="tx1"/>
                 </a:solidFill>
               </a:rPr>
-              <a:t>Cas numéro 11 :</a:t>
-            </a:r>
+              <a:t>Cas numéro 11 </a:t>
+            </a:r>
+            <a:r>
+              <a:rPr lang="fr-FR" sz="3200" dirty="0" smtClean="0">
+                <a:solidFill>
+                  <a:schemeClr val="tx1"/>
+                </a:solidFill>
+              </a:rPr>
+              <a:t>:  Quitter</a:t>
+            </a:r>
+            <a:endParaRPr lang="fr-FR" sz="3200" dirty="0" smtClean="0">
+              <a:solidFill>
+                <a:schemeClr val="tx1"/>
+              </a:solidFill>
+            </a:endParaRPr>
           </a:p>
           <a:p>
             <a:pPr marL="91440" lvl="3" indent="-91440">
@@ -6193,13 +6323,13 @@
   <p:clrMapOvr>
     <a:masterClrMapping/>
   </p:clrMapOvr>
-  <mc:AlternateContent xmlns:mc="http://schemas.openxmlformats.org/markup-compatibility/2006">
-    <mc:Choice xmlns:p14="http://schemas.microsoft.com/office/powerpoint/2010/main" Requires="p14">
+  <mc:AlternateContent xmlns:mc="http://schemas.openxmlformats.org/markup-compatibility/2006" xmlns:p14="http://schemas.microsoft.com/office/powerpoint/2010/main">
+    <mc:Choice Requires="p14">
       <p:transition spd="slow" p14:dur="1500">
         <p14:reveal/>
       </p:transition>
     </mc:Choice>
-    <mc:Fallback>
+    <mc:Fallback xmlns="">
       <p:transition spd="slow">
         <p:fade/>
       </p:transition>
@@ -6273,10 +6403,113 @@
         </p:nvSpPr>
         <p:spPr/>
         <p:txBody>
-          <a:bodyPr/>
+          <a:bodyPr>
+            <a:normAutofit/>
+          </a:bodyPr>
           <a:lstStyle/>
           <a:p>
-            <a:endParaRPr lang="fr-FR"/>
+            <a:r>
+              <a:rPr lang="fr-FR" sz="2800" dirty="0" smtClean="0">
+                <a:solidFill>
+                  <a:srgbClr val="F3A129"/>
+                </a:solidFill>
+              </a:rPr>
+              <a:t>Diagramme de classes : </a:t>
+            </a:r>
+          </a:p>
+          <a:p>
+            <a:pPr lvl="5">
+              <a:buFont typeface="Arial" panose="020B0604020202020204" pitchFamily="34" charset="0"/>
+              <a:buChar char="•"/>
+            </a:pPr>
+            <a:r>
+              <a:rPr lang="fr-FR" sz="2200" dirty="0" smtClean="0">
+                <a:solidFill>
+                  <a:schemeClr val="tx1"/>
+                </a:solidFill>
+              </a:rPr>
+              <a:t>Division en deux projets distincts :  Mini-Calculatrice et Mini-Tableur</a:t>
+            </a:r>
+          </a:p>
+          <a:p>
+            <a:pPr lvl="5">
+              <a:buFont typeface="Arial" panose="020B0604020202020204" pitchFamily="34" charset="0"/>
+              <a:buChar char="•"/>
+            </a:pPr>
+            <a:endParaRPr lang="fr-FR" sz="2200" dirty="0" smtClean="0">
+              <a:solidFill>
+                <a:schemeClr val="tx1"/>
+              </a:solidFill>
+            </a:endParaRPr>
+          </a:p>
+          <a:p>
+            <a:pPr lvl="5">
+              <a:buFont typeface="Arial" panose="020B0604020202020204" pitchFamily="34" charset="0"/>
+              <a:buChar char="•"/>
+            </a:pPr>
+            <a:r>
+              <a:rPr lang="fr-FR" sz="2200" dirty="0" smtClean="0">
+                <a:solidFill>
+                  <a:schemeClr val="tx1"/>
+                </a:solidFill>
+              </a:rPr>
+              <a:t>Division en différents packages </a:t>
+            </a:r>
+          </a:p>
+          <a:p>
+            <a:pPr lvl="5">
+              <a:buFont typeface="Arial" panose="020B0604020202020204" pitchFamily="34" charset="0"/>
+              <a:buChar char="•"/>
+            </a:pPr>
+            <a:endParaRPr lang="fr-FR" sz="2200" dirty="0" smtClean="0">
+              <a:solidFill>
+                <a:schemeClr val="tx1"/>
+              </a:solidFill>
+            </a:endParaRPr>
+          </a:p>
+          <a:p>
+            <a:pPr lvl="5">
+              <a:buFont typeface="Arial" panose="020B0604020202020204" pitchFamily="34" charset="0"/>
+              <a:buChar char="•"/>
+            </a:pPr>
+            <a:r>
+              <a:rPr lang="fr-FR" sz="2200" dirty="0" smtClean="0">
+                <a:solidFill>
+                  <a:schemeClr val="tx1"/>
+                </a:solidFill>
+              </a:rPr>
+              <a:t>Utilisation de classes abstraites</a:t>
+            </a:r>
+          </a:p>
+          <a:p>
+            <a:pPr lvl="5">
+              <a:buFont typeface="Arial" panose="020B0604020202020204" pitchFamily="34" charset="0"/>
+              <a:buChar char="•"/>
+            </a:pPr>
+            <a:endParaRPr lang="fr-FR" sz="2200" dirty="0" smtClean="0">
+              <a:solidFill>
+                <a:schemeClr val="tx1"/>
+              </a:solidFill>
+            </a:endParaRPr>
+          </a:p>
+          <a:p>
+            <a:pPr lvl="5">
+              <a:buFont typeface="Arial" panose="020B0604020202020204" pitchFamily="34" charset="0"/>
+              <a:buChar char="•"/>
+            </a:pPr>
+            <a:r>
+              <a:rPr lang="fr-FR" sz="2200" dirty="0" smtClean="0">
+                <a:solidFill>
+                  <a:schemeClr val="tx1"/>
+                </a:solidFill>
+              </a:rPr>
+              <a:t>Utilisation des liaisons telles que : l’association, la généralisation, la dépendance</a:t>
+            </a:r>
+            <a:endParaRPr lang="fr-FR" sz="2200" dirty="0">
+              <a:solidFill>
+                <a:schemeClr val="tx1"/>
+              </a:solidFill>
+            </a:endParaRPr>
           </a:p>
         </p:txBody>
       </p:sp>
@@ -6290,13 +6523,13 @@
   <p:clrMapOvr>
     <a:masterClrMapping/>
   </p:clrMapOvr>
-  <mc:AlternateContent xmlns:mc="http://schemas.openxmlformats.org/markup-compatibility/2006">
-    <mc:Choice xmlns:p14="http://schemas.microsoft.com/office/powerpoint/2010/main" Requires="p14">
+  <mc:AlternateContent xmlns:mc="http://schemas.openxmlformats.org/markup-compatibility/2006" xmlns:p14="http://schemas.microsoft.com/office/powerpoint/2010/main">
+    <mc:Choice Requires="p14">
       <p:transition spd="slow" p14:dur="1500">
         <p14:reveal/>
       </p:transition>
     </mc:Choice>
-    <mc:Fallback>
+    <mc:Fallback xmlns="">
       <p:transition spd="slow">
         <p:fade/>
       </p:transition>
@@ -6373,7 +6606,7 @@
           <a:bodyPr/>
           <a:lstStyle/>
           <a:p>
-            <a:endParaRPr lang="fr-FR"/>
+            <a:endParaRPr lang="fr-FR" dirty="0"/>
           </a:p>
         </p:txBody>
       </p:sp>
@@ -6387,13 +6620,13 @@
   <p:clrMapOvr>
     <a:masterClrMapping/>
   </p:clrMapOvr>
-  <mc:AlternateContent xmlns:mc="http://schemas.openxmlformats.org/markup-compatibility/2006">
-    <mc:Choice xmlns:p14="http://schemas.microsoft.com/office/powerpoint/2010/main" Requires="p14">
+  <mc:AlternateContent xmlns:mc="http://schemas.openxmlformats.org/markup-compatibility/2006" xmlns:p14="http://schemas.microsoft.com/office/powerpoint/2010/main">
+    <mc:Choice Requires="p14">
       <p:transition spd="slow" p14:dur="1500">
         <p14:reveal/>
       </p:transition>
     </mc:Choice>
-    <mc:Fallback>
+    <mc:Fallback xmlns="">
       <p:transition spd="slow">
         <p:fade/>
       </p:transition>
@@ -6470,7 +6703,7 @@
           <a:bodyPr/>
           <a:lstStyle/>
           <a:p>
-            <a:endParaRPr lang="fr-FR"/>
+            <a:endParaRPr lang="fr-FR" dirty="0"/>
           </a:p>
         </p:txBody>
       </p:sp>
@@ -6484,13 +6717,13 @@
   <p:clrMapOvr>
     <a:masterClrMapping/>
   </p:clrMapOvr>
-  <mc:AlternateContent xmlns:mc="http://schemas.openxmlformats.org/markup-compatibility/2006">
-    <mc:Choice xmlns:p14="http://schemas.microsoft.com/office/powerpoint/2010/main" Requires="p14">
+  <mc:AlternateContent xmlns:mc="http://schemas.openxmlformats.org/markup-compatibility/2006" xmlns:p14="http://schemas.microsoft.com/office/powerpoint/2010/main">
+    <mc:Choice Requires="p14">
       <p:transition spd="slow" p14:dur="1500">
         <p14:reveal/>
       </p:transition>
     </mc:Choice>
-    <mc:Fallback>
+    <mc:Fallback xmlns="">
       <p:transition spd="slow">
         <p:fade/>
       </p:transition>
@@ -6610,13 +6843,13 @@
   <p:clrMapOvr>
     <a:masterClrMapping/>
   </p:clrMapOvr>
-  <mc:AlternateContent xmlns:mc="http://schemas.openxmlformats.org/markup-compatibility/2006">
-    <mc:Choice xmlns:p14="http://schemas.microsoft.com/office/powerpoint/2010/main" Requires="p14">
+  <mc:AlternateContent xmlns:mc="http://schemas.openxmlformats.org/markup-compatibility/2006" xmlns:p14="http://schemas.microsoft.com/office/powerpoint/2010/main">
+    <mc:Choice Requires="p14">
       <p:transition spd="slow" p14:dur="1500">
         <p14:reveal/>
       </p:transition>
     </mc:Choice>
-    <mc:Fallback>
+    <mc:Fallback xmlns="">
       <p:transition spd="slow">
         <p:fade/>
       </p:transition>
@@ -6791,13 +7024,13 @@
   <p:clrMapOvr>
     <a:masterClrMapping/>
   </p:clrMapOvr>
-  <mc:AlternateContent xmlns:mc="http://schemas.openxmlformats.org/markup-compatibility/2006">
-    <mc:Choice xmlns:p14="http://schemas.microsoft.com/office/powerpoint/2010/main" Requires="p14">
+  <mc:AlternateContent xmlns:mc="http://schemas.openxmlformats.org/markup-compatibility/2006" xmlns:p14="http://schemas.microsoft.com/office/powerpoint/2010/main">
+    <mc:Choice Requires="p14">
       <p:transition spd="slow" p14:dur="1500">
         <p14:reveal/>
       </p:transition>
     </mc:Choice>
-    <mc:Fallback>
+    <mc:Fallback xmlns="">
       <p:transition spd="slow">
         <p:fade/>
       </p:transition>
@@ -6971,13 +7204,13 @@
   <p:clrMapOvr>
     <a:masterClrMapping/>
   </p:clrMapOvr>
-  <mc:AlternateContent xmlns:mc="http://schemas.openxmlformats.org/markup-compatibility/2006">
-    <mc:Choice xmlns:p14="http://schemas.microsoft.com/office/powerpoint/2010/main" Requires="p14">
+  <mc:AlternateContent xmlns:mc="http://schemas.openxmlformats.org/markup-compatibility/2006" xmlns:p14="http://schemas.microsoft.com/office/powerpoint/2010/main">
+    <mc:Choice Requires="p14">
       <p:transition spd="slow" p14:dur="1500">
         <p14:reveal/>
       </p:transition>
     </mc:Choice>
-    <mc:Fallback>
+    <mc:Fallback xmlns="">
       <p:transition spd="slow">
         <p:fade/>
       </p:transition>
@@ -7115,13 +7348,13 @@
   <p:clrMapOvr>
     <a:masterClrMapping/>
   </p:clrMapOvr>
-  <mc:AlternateContent xmlns:mc="http://schemas.openxmlformats.org/markup-compatibility/2006">
-    <mc:Choice xmlns:p14="http://schemas.microsoft.com/office/powerpoint/2010/main" Requires="p14">
+  <mc:AlternateContent xmlns:mc="http://schemas.openxmlformats.org/markup-compatibility/2006" xmlns:p14="http://schemas.microsoft.com/office/powerpoint/2010/main">
+    <mc:Choice Requires="p14">
       <p:transition spd="slow" p14:dur="1500">
         <p14:reveal/>
       </p:transition>
     </mc:Choice>
-    <mc:Fallback>
+    <mc:Fallback xmlns="">
       <p:transition spd="slow">
         <p:fade/>
       </p:transition>
@@ -7198,13 +7431,13 @@
   <p:clrMapOvr>
     <a:masterClrMapping/>
   </p:clrMapOvr>
-  <mc:AlternateContent xmlns:mc="http://schemas.openxmlformats.org/markup-compatibility/2006">
-    <mc:Choice xmlns:p14="http://schemas.microsoft.com/office/powerpoint/2010/main" Requires="p14">
+  <mc:AlternateContent xmlns:mc="http://schemas.openxmlformats.org/markup-compatibility/2006" xmlns:p14="http://schemas.microsoft.com/office/powerpoint/2010/main">
+    <mc:Choice Requires="p14">
       <p:transition spd="slow" p14:dur="1500">
         <p14:reveal/>
       </p:transition>
     </mc:Choice>
-    <mc:Fallback>
+    <mc:Fallback xmlns="">
       <p:transition spd="slow">
         <p:fade/>
       </p:transition>
@@ -7281,13 +7514,13 @@
   <p:clrMapOvr>
     <a:masterClrMapping/>
   </p:clrMapOvr>
-  <mc:AlternateContent xmlns:mc="http://schemas.openxmlformats.org/markup-compatibility/2006">
-    <mc:Choice xmlns:p14="http://schemas.microsoft.com/office/powerpoint/2010/main" Requires="p14">
+  <mc:AlternateContent xmlns:mc="http://schemas.openxmlformats.org/markup-compatibility/2006" xmlns:p14="http://schemas.microsoft.com/office/powerpoint/2010/main">
+    <mc:Choice Requires="p14">
       <p:transition spd="slow" p14:dur="1500">
         <p14:reveal/>
       </p:transition>
     </mc:Choice>
-    <mc:Fallback>
+    <mc:Fallback xmlns="">
       <p:transition spd="slow">
         <p:fade/>
       </p:transition>
@@ -7364,13 +7597,13 @@
   <p:clrMapOvr>
     <a:masterClrMapping/>
   </p:clrMapOvr>
-  <mc:AlternateContent xmlns:mc="http://schemas.openxmlformats.org/markup-compatibility/2006">
-    <mc:Choice xmlns:p14="http://schemas.microsoft.com/office/powerpoint/2010/main" Requires="p14">
+  <mc:AlternateContent xmlns:mc="http://schemas.openxmlformats.org/markup-compatibility/2006" xmlns:p14="http://schemas.microsoft.com/office/powerpoint/2010/main">
+    <mc:Choice Requires="p14">
       <p:transition spd="slow" p14:dur="1500">
         <p14:reveal/>
       </p:transition>
     </mc:Choice>
-    <mc:Fallback>
+    <mc:Fallback xmlns="">
       <p:transition spd="slow">
         <p:fade/>
       </p:transition>
@@ -7447,13 +7680,13 @@
   <p:clrMapOvr>
     <a:masterClrMapping/>
   </p:clrMapOvr>
-  <mc:AlternateContent xmlns:mc="http://schemas.openxmlformats.org/markup-compatibility/2006">
-    <mc:Choice xmlns:p14="http://schemas.microsoft.com/office/powerpoint/2010/main" Requires="p14">
+  <mc:AlternateContent xmlns:mc="http://schemas.openxmlformats.org/markup-compatibility/2006" xmlns:p14="http://schemas.microsoft.com/office/powerpoint/2010/main">
+    <mc:Choice Requires="p14">
       <p:transition spd="slow" p14:dur="1500">
         <p14:reveal/>
       </p:transition>
     </mc:Choice>
-    <mc:Fallback>
+    <mc:Fallback xmlns="">
       <p:transition spd="slow">
         <p:fade/>
       </p:transition>
@@ -7545,13 +7778,13 @@
   <p:clrMapOvr>
     <a:masterClrMapping/>
   </p:clrMapOvr>
-  <mc:AlternateContent xmlns:mc="http://schemas.openxmlformats.org/markup-compatibility/2006">
-    <mc:Choice xmlns:p14="http://schemas.microsoft.com/office/powerpoint/2010/main" Requires="p14">
+  <mc:AlternateContent xmlns:mc="http://schemas.openxmlformats.org/markup-compatibility/2006" xmlns:p14="http://schemas.microsoft.com/office/powerpoint/2010/main">
+    <mc:Choice Requires="p14">
       <p:transition spd="slow" p14:dur="1500">
         <p14:reveal/>
       </p:transition>
     </mc:Choice>
-    <mc:Fallback>
+    <mc:Fallback xmlns="">
       <p:transition spd="slow">
         <p:fade/>
       </p:transition>
@@ -7666,13 +7899,13 @@
   <p:clrMapOvr>
     <a:masterClrMapping/>
   </p:clrMapOvr>
-  <mc:AlternateContent xmlns:mc="http://schemas.openxmlformats.org/markup-compatibility/2006">
-    <mc:Choice xmlns:p14="http://schemas.microsoft.com/office/powerpoint/2010/main" Requires="p14">
+  <mc:AlternateContent xmlns:mc="http://schemas.openxmlformats.org/markup-compatibility/2006" xmlns:p14="http://schemas.microsoft.com/office/powerpoint/2010/main">
+    <mc:Choice Requires="p14">
       <p:transition spd="slow" p14:dur="1500">
         <p14:reveal/>
       </p:transition>
     </mc:Choice>
-    <mc:Fallback>
+    <mc:Fallback xmlns="">
       <p:transition spd="slow">
         <p:fade/>
       </p:transition>
@@ -7847,13 +8080,13 @@
   <p:clrMapOvr>
     <a:masterClrMapping/>
   </p:clrMapOvr>
-  <mc:AlternateContent xmlns:mc="http://schemas.openxmlformats.org/markup-compatibility/2006">
-    <mc:Choice xmlns:p14="http://schemas.microsoft.com/office/powerpoint/2010/main" Requires="p14">
+  <mc:AlternateContent xmlns:mc="http://schemas.openxmlformats.org/markup-compatibility/2006" xmlns:p14="http://schemas.microsoft.com/office/powerpoint/2010/main">
+    <mc:Choice Requires="p14">
       <p:transition spd="slow" p14:dur="1500">
         <p14:reveal/>
       </p:transition>
     </mc:Choice>
-    <mc:Fallback>
+    <mc:Fallback xmlns="">
       <p:transition spd="slow">
         <p:fade/>
       </p:transition>
@@ -8027,13 +8260,13 @@
   <p:clrMapOvr>
     <a:masterClrMapping/>
   </p:clrMapOvr>
-  <mc:AlternateContent xmlns:mc="http://schemas.openxmlformats.org/markup-compatibility/2006">
-    <mc:Choice xmlns:p14="http://schemas.microsoft.com/office/powerpoint/2010/main" Requires="p14">
+  <mc:AlternateContent xmlns:mc="http://schemas.openxmlformats.org/markup-compatibility/2006" xmlns:p14="http://schemas.microsoft.com/office/powerpoint/2010/main">
+    <mc:Choice Requires="p14">
       <p:transition spd="slow" p14:dur="1500">
         <p14:reveal/>
       </p:transition>
     </mc:Choice>
-    <mc:Fallback>
+    <mc:Fallback xmlns="">
       <p:transition spd="slow">
         <p:fade/>
       </p:transition>
@@ -8257,13 +8490,13 @@
   <p:clrMapOvr>
     <a:masterClrMapping/>
   </p:clrMapOvr>
-  <mc:AlternateContent xmlns:mc="http://schemas.openxmlformats.org/markup-compatibility/2006">
-    <mc:Choice xmlns:p14="http://schemas.microsoft.com/office/powerpoint/2010/main" Requires="p14">
+  <mc:AlternateContent xmlns:mc="http://schemas.openxmlformats.org/markup-compatibility/2006" xmlns:p14="http://schemas.microsoft.com/office/powerpoint/2010/main">
+    <mc:Choice Requires="p14">
       <p:transition spd="slow" p14:dur="1500">
         <p14:reveal/>
       </p:transition>
     </mc:Choice>
-    <mc:Fallback>
+    <mc:Fallback xmlns="">
       <p:transition spd="slow">
         <p:fade/>
       </p:transition>
@@ -8417,8 +8650,13 @@
             </a:r>
             <a:r>
               <a:rPr lang="fr-FR" dirty="0"/>
-              <a:t>- Calculs simples   </a:t>
-            </a:r>
+              <a:t>- Calculs </a:t>
+            </a:r>
+            <a:r>
+              <a:rPr lang="fr-FR" dirty="0" smtClean="0"/>
+              <a:t> simples   </a:t>
+            </a:r>
+            <a:endParaRPr lang="fr-FR" dirty="0"/>
           </a:p>
           <a:p>
             <a:r>
@@ -8611,13 +8849,13 @@
   <p:clrMapOvr>
     <a:masterClrMapping/>
   </p:clrMapOvr>
-  <mc:AlternateContent xmlns:mc="http://schemas.openxmlformats.org/markup-compatibility/2006">
-    <mc:Choice xmlns:p14="http://schemas.microsoft.com/office/powerpoint/2010/main" Requires="p14">
+  <mc:AlternateContent xmlns:mc="http://schemas.openxmlformats.org/markup-compatibility/2006" xmlns:p14="http://schemas.microsoft.com/office/powerpoint/2010/main">
+    <mc:Choice Requires="p14">
       <p:transition spd="slow" p14:dur="1500">
         <p14:reveal/>
       </p:transition>
     </mc:Choice>
-    <mc:Fallback>
+    <mc:Fallback xmlns="">
       <p:transition spd="slow">
         <p:fade/>
       </p:transition>
@@ -8824,13 +9062,13 @@
   <p:clrMapOvr>
     <a:masterClrMapping/>
   </p:clrMapOvr>
-  <mc:AlternateContent xmlns:mc="http://schemas.openxmlformats.org/markup-compatibility/2006">
-    <mc:Choice xmlns:p14="http://schemas.microsoft.com/office/powerpoint/2010/main" Requires="p14">
+  <mc:AlternateContent xmlns:mc="http://schemas.openxmlformats.org/markup-compatibility/2006" xmlns:p14="http://schemas.microsoft.com/office/powerpoint/2010/main">
+    <mc:Choice Requires="p14">
       <p:transition spd="slow" p14:dur="1500">
         <p14:reveal/>
       </p:transition>
     </mc:Choice>
-    <mc:Fallback>
+    <mc:Fallback xmlns="">
       <p:transition spd="slow">
         <p:fade/>
       </p:transition>
@@ -9062,13 +9300,13 @@
   <p:clrMapOvr>
     <a:masterClrMapping/>
   </p:clrMapOvr>
-  <mc:AlternateContent xmlns:mc="http://schemas.openxmlformats.org/markup-compatibility/2006">
-    <mc:Choice xmlns:p14="http://schemas.microsoft.com/office/powerpoint/2010/main" Requires="p14">
+  <mc:AlternateContent xmlns:mc="http://schemas.openxmlformats.org/markup-compatibility/2006" xmlns:p14="http://schemas.microsoft.com/office/powerpoint/2010/main">
+    <mc:Choice Requires="p14">
       <p:transition spd="slow" p14:dur="1500">
         <p14:reveal/>
       </p:transition>
     </mc:Choice>
-    <mc:Fallback>
+    <mc:Fallback xmlns="">
       <p:transition spd="slow">
         <p:fade/>
       </p:transition>
@@ -9202,15 +9440,7 @@
                   <a:srgbClr val="FF0000"/>
                 </a:solidFill>
               </a:rPr>
-              <a:t>Exigences </a:t>
-            </a:r>
-            <a:r>
-              <a:rPr lang="fr-FR" sz="2400" dirty="0" smtClean="0">
-                <a:solidFill>
-                  <a:srgbClr val="FF0000"/>
-                </a:solidFill>
-              </a:rPr>
-              <a:t>/ Risques identifiés</a:t>
+              <a:t>Exigences / Risques identifiés</a:t>
             </a:r>
             <a:endParaRPr lang="fr-FR" sz="2400" dirty="0">
               <a:solidFill>
@@ -9264,13 +9494,13 @@
   <p:clrMapOvr>
     <a:masterClrMapping/>
   </p:clrMapOvr>
-  <mc:AlternateContent xmlns:mc="http://schemas.openxmlformats.org/markup-compatibility/2006">
-    <mc:Choice xmlns:p14="http://schemas.microsoft.com/office/powerpoint/2010/main" Requires="p14">
+  <mc:AlternateContent xmlns:mc="http://schemas.openxmlformats.org/markup-compatibility/2006" xmlns:p14="http://schemas.microsoft.com/office/powerpoint/2010/main">
+    <mc:Choice Requires="p14">
       <p:transition spd="slow" p14:dur="1500">
         <p14:reveal/>
       </p:transition>
     </mc:Choice>
-    <mc:Fallback>
+    <mc:Fallback xmlns="">
       <p:transition spd="slow">
         <p:fade/>
       </p:transition>
@@ -9457,13 +9687,13 @@
   <p:clrMapOvr>
     <a:masterClrMapping/>
   </p:clrMapOvr>
-  <mc:AlternateContent xmlns:mc="http://schemas.openxmlformats.org/markup-compatibility/2006">
-    <mc:Choice xmlns:p14="http://schemas.microsoft.com/office/powerpoint/2010/main" Requires="p14">
+  <mc:AlternateContent xmlns:mc="http://schemas.openxmlformats.org/markup-compatibility/2006" xmlns:p14="http://schemas.microsoft.com/office/powerpoint/2010/main">
+    <mc:Choice Requires="p14">
       <p:transition spd="slow" p14:dur="1500">
         <p14:reveal/>
       </p:transition>
     </mc:Choice>
-    <mc:Fallback>
+    <mc:Fallback xmlns="">
       <p:transition spd="slow">
         <p:fade/>
       </p:transition>
@@ -9638,13 +9868,13 @@
   <p:clrMapOvr>
     <a:masterClrMapping/>
   </p:clrMapOvr>
-  <mc:AlternateContent xmlns:mc="http://schemas.openxmlformats.org/markup-compatibility/2006">
-    <mc:Choice xmlns:p14="http://schemas.microsoft.com/office/powerpoint/2010/main" Requires="p14">
+  <mc:AlternateContent xmlns:mc="http://schemas.openxmlformats.org/markup-compatibility/2006" xmlns:p14="http://schemas.microsoft.com/office/powerpoint/2010/main">
+    <mc:Choice Requires="p14">
       <p:transition spd="slow" p14:dur="1500">
         <p14:reveal/>
       </p:transition>
     </mc:Choice>
-    <mc:Fallback>
+    <mc:Fallback xmlns="">
       <p:transition spd="slow">
         <p:fade/>
       </p:transition>
@@ -9937,7 +10167,7 @@
   <a:extraClrSchemeLst/>
   <a:extLst>
     <a:ext uri="{05A4C25C-085E-4340-85A3-A5531E510DB2}">
-      <thm15:themeFamily xmlns:thm15="http://schemas.microsoft.com/office/thememl/2012/main" xmlns="" name="Retrospect" id="{5F128B03-DCCA-4EEB-AB3B-CF2899314A46}" vid="{3F1AAB62-24C6-49D2-8E01-B56FAC9A3DCD}"/>
+      <thm15:themeFamily xmlns="" xmlns:thm15="http://schemas.microsoft.com/office/thememl/2012/main" name="Retrospect" id="{5F128B03-DCCA-4EEB-AB3B-CF2899314A46}" vid="{3F1AAB62-24C6-49D2-8E01-B56FAC9A3DCD}"/>
     </a:ext>
   </a:extLst>
 </a:theme>

</xml_diff>